<commit_message>
Update Location Finders Presentation.pptx
Updated the presentation
</commit_message>
<xml_diff>
--- a/Presentation and Documentation/Location Finders Presentation.pptx
+++ b/Presentation and Documentation/Location Finders Presentation.pptx
@@ -8,8 +8,9 @@
     <p:sldId id="256" r:id="rId2"/>
     <p:sldId id="257" r:id="rId3"/>
     <p:sldId id="258" r:id="rId4"/>
-    <p:sldId id="259" r:id="rId5"/>
-    <p:sldId id="260" r:id="rId6"/>
+    <p:sldId id="261" r:id="rId5"/>
+    <p:sldId id="259" r:id="rId6"/>
+    <p:sldId id="260" r:id="rId7"/>
   </p:sldIdLst>
   <p:sldSz cx="12192000" cy="6858000"/>
   <p:notesSz cx="6858000" cy="9144000"/>
@@ -119,7 +120,9 @@
 <file path=ppt/revisionInfo.xml><?xml version="1.0" encoding="utf-8"?>
 <p1510:revInfo xmlns:a="http://schemas.openxmlformats.org/drawingml/2006/main" xmlns:r="http://schemas.openxmlformats.org/officeDocument/2006/relationships" xmlns:p1510="http://schemas.microsoft.com/office/powerpoint/2015/10/main">
   <p1510:revLst>
+    <p1510:client id="{6C4B7979-79F1-4A1A-AA74-C11C7E764C7D}" v="77" dt="2022-03-20T15:14:35.089"/>
     <p1510:client id="{7E2EAEE0-EFA3-49FE-8A7C-7EFBDACDF429}" v="425" dt="2022-03-17T18:06:29.332"/>
+    <p1510:client id="{DF9FB38C-2E24-44DD-9458-2F3D85BCB029}" v="243" dt="2022-03-20T15:05:30.808"/>
   </p1510:revLst>
 </p1510:revInfo>
 </file>
@@ -5664,14 +5667,15 @@
           <a:p>
             <a:pPr algn="ctr"/>
             <a:r>
-              <a:rPr lang="en-US" sz="6000" b="1" dirty="0">
+              <a:rPr lang="en" sz="6000" dirty="0">
                 <a:latin typeface="Times New Roman"/>
                 <a:cs typeface="Calibri Light"/>
               </a:rPr>
-              <a:t>УЧАСТНИЦИ</a:t>
-            </a:r>
-            <a:endParaRPr lang="en-US" sz="6000" b="1">
-              <a:cs typeface="Arial"/>
+              <a:t>Participants</a:t>
+            </a:r>
+            <a:endParaRPr lang="en-US" sz="6000">
+              <a:latin typeface="Times New Roman"/>
+              <a:cs typeface="Times New Roman"/>
             </a:endParaRPr>
           </a:p>
         </p:txBody>
@@ -5712,11 +5716,32 @@
               <a:buChar char="v"/>
             </a:pPr>
             <a:r>
+              <a:rPr lang="en-US" sz="3200" b="1" dirty="0" err="1">
+                <a:latin typeface="Times New Roman"/>
+                <a:cs typeface="Calibri" panose="020F0502020204030204"/>
+              </a:rPr>
+              <a:t>Мартин</a:t>
+            </a:r>
+            <a:r>
               <a:rPr lang="en-US" sz="3200" b="1" dirty="0">
                 <a:latin typeface="Times New Roman"/>
                 <a:cs typeface="Calibri" panose="020F0502020204030204"/>
               </a:rPr>
-              <a:t>Мартин Кафеджиев IX a - </a:t>
+              <a:t> </a:t>
+            </a:r>
+            <a:r>
+              <a:rPr lang="en-US" sz="3200" b="1" dirty="0" err="1">
+                <a:latin typeface="Times New Roman"/>
+                <a:cs typeface="Calibri" panose="020F0502020204030204"/>
+              </a:rPr>
+              <a:t>Кафеджиев</a:t>
+            </a:r>
+            <a:r>
+              <a:rPr lang="en-US" sz="3200" b="1" dirty="0">
+                <a:latin typeface="Times New Roman"/>
+                <a:cs typeface="Calibri" panose="020F0502020204030204"/>
+              </a:rPr>
+              <a:t> IX a - </a:t>
             </a:r>
             <a:r>
               <a:rPr lang="en-US" sz="3200" dirty="0">
@@ -5725,7 +5750,7 @@
               </a:rPr>
               <a:t>Scrum Trainer</a:t>
             </a:r>
-            <a:endParaRPr lang="en-US" sz="3200" dirty="0">
+            <a:endParaRPr lang="en-US" sz="3200">
               <a:cs typeface="Calibri" panose="020F0502020204030204"/>
             </a:endParaRPr>
           </a:p>
@@ -5738,7 +5763,7 @@
               <a:buChar char="v"/>
             </a:pPr>
             <a:r>
-              <a:rPr lang="en-US" sz="3200" b="1" dirty="0" err="1">
+              <a:rPr lang="en-US" sz="3200" b="1" err="1">
                 <a:latin typeface="Times New Roman"/>
                 <a:cs typeface="Calibri" panose="020F0502020204030204"/>
               </a:rPr>
@@ -5752,7 +5777,7 @@
               <a:t> </a:t>
             </a:r>
             <a:r>
-              <a:rPr lang="en-US" sz="3200" b="1" dirty="0" err="1">
+              <a:rPr lang="en-US" sz="3200" b="1" err="1">
                 <a:latin typeface="Times New Roman"/>
                 <a:cs typeface="Calibri" panose="020F0502020204030204"/>
               </a:rPr>
@@ -5782,7 +5807,7 @@
               <a:buChar char="v"/>
             </a:pPr>
             <a:r>
-              <a:rPr lang="en-US" sz="3200" b="1" dirty="0" err="1">
+              <a:rPr lang="en-US" sz="3200" b="1" err="1">
                 <a:latin typeface="Times New Roman"/>
                 <a:cs typeface="Calibri" panose="020F0502020204030204"/>
               </a:rPr>
@@ -5796,7 +5821,7 @@
               <a:t> </a:t>
             </a:r>
             <a:r>
-              <a:rPr lang="en-US" sz="3200" b="1" dirty="0" err="1">
+              <a:rPr lang="en-US" sz="3200" b="1" err="1">
                 <a:latin typeface="Times New Roman"/>
                 <a:cs typeface="Calibri" panose="020F0502020204030204"/>
               </a:rPr>
@@ -5826,7 +5851,7 @@
               <a:buChar char="v"/>
             </a:pPr>
             <a:r>
-              <a:rPr lang="en-US" sz="3200" b="1" dirty="0" err="1">
+              <a:rPr lang="en-US" sz="3200" b="1" err="1">
                 <a:latin typeface="Times New Roman"/>
                 <a:cs typeface="Calibri" panose="020F0502020204030204"/>
               </a:rPr>
@@ -5840,7 +5865,7 @@
               <a:t> </a:t>
             </a:r>
             <a:r>
-              <a:rPr lang="en-US" sz="3200" b="1" dirty="0" err="1">
+              <a:rPr lang="en-US" sz="3200" b="1" err="1">
                 <a:latin typeface="Times New Roman"/>
                 <a:cs typeface="Calibri" panose="020F0502020204030204"/>
               </a:rPr>
@@ -5975,7 +6000,7 @@
         <p:spPr>
           <a:xfrm>
             <a:off x="2141567" y="390866"/>
-            <a:ext cx="8421095" cy="1008111"/>
+            <a:ext cx="8446215" cy="1753363"/>
           </a:xfrm>
         </p:spPr>
         <p:txBody>
@@ -5990,10 +6015,11 @@
                 <a:latin typeface="Times New Roman"/>
                 <a:cs typeface="Calibri Light"/>
               </a:rPr>
-              <a:t>ГЛАВНА МИСЪЛ НА ПРОЕКТА</a:t>
-            </a:r>
-            <a:endParaRPr lang="en-US" sz="6000">
-              <a:cs typeface="Arial" panose="020B0604020202020204"/>
+              <a:t>Purpose of the project</a:t>
+            </a:r>
+            <a:endParaRPr lang="en-US" sz="3200">
+              <a:latin typeface="Times New Roman"/>
+              <a:cs typeface="Times New Roman"/>
             </a:endParaRPr>
           </a:p>
         </p:txBody>
@@ -6089,19 +6115,20 @@
           </a:bodyPr>
           <a:lstStyle/>
           <a:p>
-            <a:pPr marL="6160" indent="0">
+            <a:pPr marL="6350" indent="0">
               <a:buNone/>
             </a:pPr>
             <a:r>
-              <a:rPr lang="bg-BG" sz="3600" dirty="0">
-                <a:latin typeface="Times New Roman" panose="02020603050405020304" pitchFamily="18" charset="0"/>
-                <a:cs typeface="Times New Roman" panose="02020603050405020304" pitchFamily="18" charset="0"/>
+              <a:rPr lang="en-US" sz="3200" dirty="0">
+                <a:latin typeface="Times New Roman"/>
+                <a:ea typeface="+mn-lt"/>
+                <a:cs typeface="+mn-lt"/>
               </a:rPr>
-              <a:t>Главната ни мисъл беше да направим игра за деца с която те ще научат влаговете на различни страни докато развиват паметта си, въображението си, и креативността си.</a:t>
-            </a:r>
-            <a:endParaRPr lang="en-US" sz="3600" dirty="0">
-              <a:latin typeface="Times New Roman" panose="02020603050405020304" pitchFamily="18" charset="0"/>
-              <a:cs typeface="Times New Roman" panose="02020603050405020304" pitchFamily="18" charset="0"/>
+              <a:t>Our main idea was to make a game for children with which they can learn the flags of different countries while developing their memory, imagination and creativity.</a:t>
+            </a:r>
+            <a:endParaRPr lang="en-US" sz="3200">
+              <a:latin typeface="Times New Roman"/>
+              <a:cs typeface="Times New Roman"/>
             </a:endParaRPr>
           </a:p>
         </p:txBody>
@@ -6120,6 +6147,124 @@
 </file>
 
 <file path=ppt/slides/slide4.xml><?xml version="1.0" encoding="utf-8"?>
+<p:sld xmlns:a="http://schemas.openxmlformats.org/drawingml/2006/main" xmlns:r="http://schemas.openxmlformats.org/officeDocument/2006/relationships" xmlns:p="http://schemas.openxmlformats.org/presentationml/2006/main">
+  <p:cSld>
+    <p:spTree>
+      <p:nvGrpSpPr>
+        <p:cNvPr id="1" name=""/>
+        <p:cNvGrpSpPr/>
+        <p:nvPr/>
+      </p:nvGrpSpPr>
+      <p:grpSpPr>
+        <a:xfrm>
+          <a:off x="0" y="0"/>
+          <a:ext cx="0" cy="0"/>
+          <a:chOff x="0" y="0"/>
+          <a:chExt cx="0" cy="0"/>
+        </a:xfrm>
+      </p:grpSpPr>
+      <p:sp>
+        <p:nvSpPr>
+          <p:cNvPr id="2" name="Title 1">
+            <a:extLst>
+              <a:ext uri="{FF2B5EF4-FFF2-40B4-BE49-F238E27FC236}">
+                <a16:creationId xmlns:a16="http://schemas.microsoft.com/office/drawing/2014/main" id="{038E5288-7131-4EFF-B5CF-9EFDA899E62D}"/>
+              </a:ext>
+            </a:extLst>
+          </p:cNvPr>
+          <p:cNvSpPr>
+            <a:spLocks noGrp="1"/>
+          </p:cNvSpPr>
+          <p:nvPr>
+            <p:ph type="title"/>
+          </p:nvPr>
+        </p:nvSpPr>
+        <p:spPr>
+          <a:xfrm>
+            <a:off x="3884599" y="749441"/>
+            <a:ext cx="4433035" cy="1077229"/>
+          </a:xfrm>
+        </p:spPr>
+        <p:txBody>
+          <a:bodyPr>
+            <a:normAutofit/>
+          </a:bodyPr>
+          <a:lstStyle/>
+          <a:p>
+            <a:pPr algn="ctr"/>
+            <a:r>
+              <a:rPr lang="en-US" sz="6000" b="1" dirty="0">
+                <a:latin typeface="Times New Roman"/>
+                <a:cs typeface="Arial"/>
+              </a:rPr>
+              <a:t>Future plans</a:t>
+            </a:r>
+            <a:endParaRPr lang="en-US" sz="6000" b="1">
+              <a:latin typeface="Times New Roman"/>
+              <a:cs typeface="Times New Roman"/>
+            </a:endParaRPr>
+          </a:p>
+        </p:txBody>
+      </p:sp>
+      <p:sp>
+        <p:nvSpPr>
+          <p:cNvPr id="3" name="Content Placeholder 2">
+            <a:extLst>
+              <a:ext uri="{FF2B5EF4-FFF2-40B4-BE49-F238E27FC236}">
+                <a16:creationId xmlns:a16="http://schemas.microsoft.com/office/drawing/2014/main" id="{3733812D-FE19-4971-B8F8-D569B5807FB5}"/>
+              </a:ext>
+            </a:extLst>
+          </p:cNvPr>
+          <p:cNvSpPr>
+            <a:spLocks noGrp="1"/>
+          </p:cNvSpPr>
+          <p:nvPr>
+            <p:ph idx="1"/>
+          </p:nvPr>
+        </p:nvSpPr>
+        <p:spPr>
+          <a:xfrm>
+            <a:off x="2195819" y="2119105"/>
+            <a:ext cx="7796540" cy="3997828"/>
+          </a:xfrm>
+        </p:spPr>
+        <p:txBody>
+          <a:bodyPr>
+            <a:normAutofit/>
+          </a:bodyPr>
+          <a:lstStyle/>
+          <a:p>
+            <a:pPr marL="6350" indent="0">
+              <a:buNone/>
+            </a:pPr>
+            <a:r>
+              <a:rPr lang="en" sz="3200" dirty="0">
+                <a:latin typeface="Times New Roman"/>
+                <a:cs typeface="Arial"/>
+              </a:rPr>
+              <a:t>We plan to add more countries from different continents and improve the drawing page so you can see your result compared to the original flag of the country you selected.</a:t>
+            </a:r>
+            <a:endParaRPr lang="en" sz="3200">
+              <a:latin typeface="Times New Roman"/>
+              <a:cs typeface="Times New Roman"/>
+            </a:endParaRPr>
+          </a:p>
+        </p:txBody>
+      </p:sp>
+    </p:spTree>
+    <p:extLst>
+      <p:ext uri="{BB962C8B-B14F-4D97-AF65-F5344CB8AC3E}">
+        <p14:creationId xmlns:p14="http://schemas.microsoft.com/office/powerpoint/2010/main" val="3439515717"/>
+      </p:ext>
+    </p:extLst>
+  </p:cSld>
+  <p:clrMapOvr>
+    <a:masterClrMapping/>
+  </p:clrMapOvr>
+</p:sld>
+</file>
+
+<file path=ppt/slides/slide5.xml><?xml version="1.0" encoding="utf-8"?>
 <p:sld xmlns:a="http://schemas.openxmlformats.org/drawingml/2006/main" xmlns:r="http://schemas.openxmlformats.org/officeDocument/2006/relationships" xmlns:p="http://schemas.openxmlformats.org/presentationml/2006/main">
   <p:cSld>
     <p:bg>
@@ -6381,8 +6526,8 @@
         </p:nvSpPr>
         <p:spPr>
           <a:xfrm>
-            <a:off x="2954343" y="347789"/>
-            <a:ext cx="5416708" cy="1458229"/>
+            <a:off x="3046453" y="356163"/>
+            <a:ext cx="5542312" cy="1449856"/>
           </a:xfrm>
         </p:spPr>
         <p:txBody>
@@ -6397,11 +6542,10 @@
                 <a:latin typeface="Times New Roman"/>
                 <a:cs typeface="Times New Roman"/>
               </a:rPr>
-              <a:t>ИЗПОЛВАНИ ТЕХНОЛОГИИ</a:t>
+              <a:t>Technologies used</a:t>
             </a:r>
             <a:endParaRPr lang="en-US" sz="6000">
-              <a:latin typeface="Times New Roman"/>
-              <a:cs typeface="Times New Roman"/>
+              <a:cs typeface="Arial"/>
             </a:endParaRPr>
           </a:p>
         </p:txBody>
@@ -6457,7 +6601,7 @@
         </p:blipFill>
         <p:spPr>
           <a:xfrm>
-            <a:off x="5759174" y="4011544"/>
+            <a:off x="5672518" y="4011552"/>
             <a:ext cx="3365811" cy="1831122"/>
           </a:xfrm>
           <a:prstGeom prst="rect">
@@ -6560,102 +6704,10 @@
       </p:pic>
       <p:pic>
         <p:nvPicPr>
-          <p:cNvPr id="1026" name="Picture 2">
+          <p:cNvPr id="3" name="Picture 3" descr="Icon&#10;&#10;Description automatically generated">
             <a:extLst>
               <a:ext uri="{FF2B5EF4-FFF2-40B4-BE49-F238E27FC236}">
-                <a16:creationId xmlns:a16="http://schemas.microsoft.com/office/drawing/2014/main" id="{74CC7E54-5D23-43D7-A217-46EBAEB2DEA2}"/>
-              </a:ext>
-            </a:extLst>
-          </p:cNvPr>
-          <p:cNvPicPr>
-            <a:picLocks noChangeAspect="1" noChangeArrowheads="1"/>
-          </p:cNvPicPr>
-          <p:nvPr/>
-        </p:nvPicPr>
-        <p:blipFill>
-          <a:blip r:embed="rId8" cstate="print">
-            <a:extLst>
-              <a:ext uri="{28A0092B-C50C-407E-A947-70E740481C1C}">
-                <a14:useLocalDpi xmlns:a14="http://schemas.microsoft.com/office/drawing/2010/main" val="0"/>
-              </a:ext>
-            </a:extLst>
-          </a:blip>
-          <a:srcRect/>
-          <a:stretch>
-            <a:fillRect/>
-          </a:stretch>
-        </p:blipFill>
-        <p:spPr bwMode="auto">
-          <a:xfrm>
-            <a:off x="7492862" y="1772173"/>
-            <a:ext cx="2586106" cy="1656826"/>
-          </a:xfrm>
-          <a:prstGeom prst="rect">
-            <a:avLst/>
-          </a:prstGeom>
-          <a:noFill/>
-          <a:extLst>
-            <a:ext uri="{909E8E84-426E-40DD-AFC4-6F175D3DCCD1}">
-              <a14:hiddenFill xmlns:a14="http://schemas.microsoft.com/office/drawing/2010/main">
-                <a:solidFill>
-                  <a:srgbClr val="FFFFFF"/>
-                </a:solidFill>
-              </a14:hiddenFill>
-            </a:ext>
-          </a:extLst>
-        </p:spPr>
-      </p:pic>
-      <p:pic>
-        <p:nvPicPr>
-          <p:cNvPr id="1028" name="Picture 4" descr="Pixlr E Design / Photo Editor – Приложения в Google Play">
-            <a:extLst>
-              <a:ext uri="{FF2B5EF4-FFF2-40B4-BE49-F238E27FC236}">
-                <a16:creationId xmlns:a16="http://schemas.microsoft.com/office/drawing/2014/main" id="{8B0DEE9B-3C2D-4385-AED3-21F697E66FD6}"/>
-              </a:ext>
-            </a:extLst>
-          </p:cNvPr>
-          <p:cNvPicPr>
-            <a:picLocks noChangeAspect="1" noChangeArrowheads="1"/>
-          </p:cNvPicPr>
-          <p:nvPr/>
-        </p:nvPicPr>
-        <p:blipFill rotWithShape="1">
-          <a:blip r:embed="rId9" cstate="print">
-            <a:extLst>
-              <a:ext uri="{28A0092B-C50C-407E-A947-70E740481C1C}">
-                <a14:useLocalDpi xmlns:a14="http://schemas.microsoft.com/office/drawing/2010/main" val="0"/>
-              </a:ext>
-            </a:extLst>
-          </a:blip>
-          <a:srcRect l="16660" r="17383"/>
-          <a:stretch/>
-        </p:blipFill>
-        <p:spPr bwMode="auto">
-          <a:xfrm>
-            <a:off x="5551359" y="1896616"/>
-            <a:ext cx="1263863" cy="1916185"/>
-          </a:xfrm>
-          <a:prstGeom prst="rect">
-            <a:avLst/>
-          </a:prstGeom>
-          <a:noFill/>
-          <a:extLst>
-            <a:ext uri="{909E8E84-426E-40DD-AFC4-6F175D3DCCD1}">
-              <a14:hiddenFill xmlns:a14="http://schemas.microsoft.com/office/drawing/2010/main">
-                <a:solidFill>
-                  <a:srgbClr val="FFFFFF"/>
-                </a:solidFill>
-              </a14:hiddenFill>
-            </a:ext>
-          </a:extLst>
-        </p:spPr>
-      </p:pic>
-      <p:pic>
-        <p:nvPicPr>
-          <p:cNvPr id="4" name="Graphic 3">
-            <a:extLst>
-              <a:ext uri="{FF2B5EF4-FFF2-40B4-BE49-F238E27FC236}">
-                <a16:creationId xmlns:a16="http://schemas.microsoft.com/office/drawing/2014/main" id="{D2A81428-AFB7-4D2E-9014-567ECB7F3D6B}"/>
+                <a16:creationId xmlns:a16="http://schemas.microsoft.com/office/drawing/2014/main" id="{C55C5E77-D9E3-4DB6-9D26-C4A4DB2C73E7}"/>
               </a:ext>
             </a:extLst>
           </p:cNvPr>
@@ -6664,24 +6716,76 @@
           </p:cNvPicPr>
           <p:nvPr/>
         </p:nvPicPr>
-        <p:blipFill rotWithShape="1">
-          <a:blip r:embed="rId10" cstate="print">
+        <p:blipFill>
+          <a:blip r:embed="rId8"/>
+          <a:stretch>
+            <a:fillRect/>
+          </a:stretch>
+        </p:blipFill>
+        <p:spPr>
+          <a:xfrm>
+            <a:off x="4372707" y="1811039"/>
+            <a:ext cx="1294563" cy="1921263"/>
+          </a:xfrm>
+          <a:prstGeom prst="rect">
+            <a:avLst/>
+          </a:prstGeom>
+        </p:spPr>
+      </p:pic>
+      <p:pic>
+        <p:nvPicPr>
+          <p:cNvPr id="11" name="Picture 11">
             <a:extLst>
-              <a:ext uri="{28A0092B-C50C-407E-A947-70E740481C1C}">
-                <a14:useLocalDpi xmlns:a14="http://schemas.microsoft.com/office/drawing/2010/main" val="0"/>
-              </a:ext>
-              <a:ext uri="{96DAC541-7B7A-43D3-8B79-37D633B846F1}">
-                <asvg:svgBlip xmlns:asvg="http://schemas.microsoft.com/office/drawing/2016/SVG/main" r:embed="rId11"/>
+              <a:ext uri="{FF2B5EF4-FFF2-40B4-BE49-F238E27FC236}">
+                <a16:creationId xmlns:a16="http://schemas.microsoft.com/office/drawing/2014/main" id="{A80A28F3-BF7F-4714-9694-F47E5C32F175}"/>
               </a:ext>
             </a:extLst>
-          </a:blip>
-          <a:srcRect l="16540" r="16769"/>
-          <a:stretch/>
+          </p:cNvPr>
+          <p:cNvPicPr>
+            <a:picLocks noChangeAspect="1"/>
+          </p:cNvPicPr>
+          <p:nvPr/>
+        </p:nvPicPr>
+        <p:blipFill>
+          <a:blip r:embed="rId9"/>
+          <a:stretch>
+            <a:fillRect/>
+          </a:stretch>
         </p:blipFill>
         <p:spPr>
           <a:xfrm>
-            <a:off x="4273432" y="1896616"/>
-            <a:ext cx="1277927" cy="1916185"/>
+            <a:off x="5675641" y="1807029"/>
+            <a:ext cx="1292894" cy="1929283"/>
+          </a:xfrm>
+          <a:prstGeom prst="rect">
+            <a:avLst/>
+          </a:prstGeom>
+        </p:spPr>
+      </p:pic>
+      <p:pic>
+        <p:nvPicPr>
+          <p:cNvPr id="15" name="Picture 15" descr="A picture containing accessory, vector graphics, silhouette&#10;&#10;Description automatically generated">
+            <a:extLst>
+              <a:ext uri="{FF2B5EF4-FFF2-40B4-BE49-F238E27FC236}">
+                <a16:creationId xmlns:a16="http://schemas.microsoft.com/office/drawing/2014/main" id="{1F817974-C914-43E8-BAAD-81FDC72C0EE8}"/>
+              </a:ext>
+            </a:extLst>
+          </p:cNvPr>
+          <p:cNvPicPr>
+            <a:picLocks noChangeAspect="1"/>
+          </p:cNvPicPr>
+          <p:nvPr/>
+        </p:nvPicPr>
+        <p:blipFill>
+          <a:blip r:embed="rId10"/>
+          <a:stretch>
+            <a:fillRect/>
+          </a:stretch>
+        </p:blipFill>
+        <p:spPr>
+          <a:xfrm>
+            <a:off x="7764027" y="1805067"/>
+            <a:ext cx="2709705" cy="1941581"/>
           </a:xfrm>
           <a:prstGeom prst="rect">
             <a:avLst/>
@@ -6701,7 +6805,7 @@
 </p:sld>
 </file>
 
-<file path=ppt/slides/slide5.xml><?xml version="1.0" encoding="utf-8"?>
+<file path=ppt/slides/slide6.xml><?xml version="1.0" encoding="utf-8"?>
 <p:sld xmlns:a="http://schemas.openxmlformats.org/drawingml/2006/main" xmlns:r="http://schemas.openxmlformats.org/officeDocument/2006/relationships" xmlns:p="http://schemas.openxmlformats.org/presentationml/2006/main">
   <p:cSld>
     <p:spTree>
@@ -6752,12 +6856,41 @@
                 <a:latin typeface="Times New Roman"/>
                 <a:cs typeface="Calibri Light"/>
               </a:rPr>
-              <a:t>БЛАГОДАРЯ ЗА ВНИМАНИЕТО!</a:t>
-            </a:r>
-            <a:endParaRPr lang="en-US" sz="6000" b="1">
-              <a:latin typeface="Times New Roman"/>
-              <a:cs typeface="Times New Roman"/>
+              <a:t>Thank you for your attention!</a:t>
+            </a:r>
+            <a:endParaRPr lang="en-US">
+              <a:cs typeface="Arial" panose="020B0604020202020204"/>
             </a:endParaRPr>
+          </a:p>
+        </p:txBody>
+      </p:sp>
+      <p:sp>
+        <p:nvSpPr>
+          <p:cNvPr id="3" name="Content Placeholder 2">
+            <a:extLst>
+              <a:ext uri="{FF2B5EF4-FFF2-40B4-BE49-F238E27FC236}">
+                <a16:creationId xmlns:a16="http://schemas.microsoft.com/office/drawing/2014/main" id="{2F820535-BFED-446D-99EF-5DCFE3A39ECD}"/>
+              </a:ext>
+            </a:extLst>
+          </p:cNvPr>
+          <p:cNvSpPr>
+            <a:spLocks noGrp="1"/>
+          </p:cNvSpPr>
+          <p:nvPr>
+            <p:ph idx="1"/>
+          </p:nvPr>
+        </p:nvSpPr>
+        <p:spPr>
+          <a:xfrm>
+            <a:off x="2207542" y="6602345"/>
+            <a:ext cx="7796540" cy="3997828"/>
+          </a:xfrm>
+        </p:spPr>
+        <p:txBody>
+          <a:bodyPr/>
+          <a:lstStyle/>
+          <a:p>
+            <a:endParaRPr lang="en-US"/>
           </a:p>
         </p:txBody>
       </p:sp>
@@ -6824,42 +6957,6 @@
           </a:custGeom>
         </p:spPr>
       </p:pic>
-      <p:sp>
-        <p:nvSpPr>
-          <p:cNvPr id="4" name="TextBox 3">
-            <a:extLst>
-              <a:ext uri="{FF2B5EF4-FFF2-40B4-BE49-F238E27FC236}">
-                <a16:creationId xmlns:a16="http://schemas.microsoft.com/office/drawing/2014/main" id="{D8FE7F36-9D1E-4D47-9B58-6BC8A1191A3E}"/>
-              </a:ext>
-            </a:extLst>
-          </p:cNvPr>
-          <p:cNvSpPr txBox="1"/>
-          <p:nvPr/>
-        </p:nvSpPr>
-        <p:spPr>
-          <a:xfrm>
-            <a:off x="2207542" y="5780015"/>
-            <a:ext cx="1967205" cy="369332"/>
-          </a:xfrm>
-          <a:prstGeom prst="rect">
-            <a:avLst/>
-          </a:prstGeom>
-          <a:noFill/>
-        </p:spPr>
-        <p:txBody>
-          <a:bodyPr wrap="none" rtlCol="0">
-            <a:spAutoFit/>
-          </a:bodyPr>
-          <a:lstStyle/>
-          <a:p>
-            <a:r>
-              <a:rPr lang="en-US" dirty="0"/>
-              <a:t>-Location Finders</a:t>
-            </a:r>
-            <a:endParaRPr lang="bg-BG" dirty="0"/>
-          </a:p>
-        </p:txBody>
-      </p:sp>
     </p:spTree>
     <p:extLst>
       <p:ext uri="{BB962C8B-B14F-4D97-AF65-F5344CB8AC3E}">

</xml_diff>